<commit_message>
rearrange to match ordering in Materials
</commit_message>
<xml_diff>
--- a/Slides/Slides-04-Introduction_to_Valtools/Slides-04-03-Modes_of_Validation/Slides-04-03-Modes_of_Validation.pptx
+++ b/Slides/Slides-04-Introduction_to_Valtools/Slides-04-03-Modes_of_Validation/Slides-04-03-Modes_of_Validation.pptx
@@ -5,20 +5,22 @@
     <p:sldMasterId id="2147483673" r:id="rId4"/>
   </p:sldMasterIdLst>
   <p:notesMasterIdLst>
-    <p:notesMasterId r:id="rId16"/>
+    <p:notesMasterId r:id="rId18"/>
   </p:notesMasterIdLst>
   <p:sldIdLst>
     <p:sldId id="257" r:id="rId5"/>
     <p:sldId id="262" r:id="rId6"/>
-    <p:sldId id="333" r:id="rId7"/>
-    <p:sldId id="381" r:id="rId8"/>
-    <p:sldId id="396" r:id="rId9"/>
-    <p:sldId id="397" r:id="rId10"/>
+    <p:sldId id="402" r:id="rId7"/>
+    <p:sldId id="403" r:id="rId8"/>
+    <p:sldId id="333" r:id="rId9"/>
+    <p:sldId id="381" r:id="rId10"/>
     <p:sldId id="398" r:id="rId11"/>
     <p:sldId id="399" r:id="rId12"/>
     <p:sldId id="400" r:id="rId13"/>
     <p:sldId id="401" r:id="rId14"/>
-    <p:sldId id="330" r:id="rId15"/>
+    <p:sldId id="396" r:id="rId15"/>
+    <p:sldId id="397" r:id="rId16"/>
+    <p:sldId id="330" r:id="rId17"/>
   </p:sldIdLst>
   <p:sldSz cx="12192000" cy="6858000"/>
   <p:notesSz cx="6858000" cy="9144000"/>
@@ -745,6 +747,195 @@
     </p:spTree>
     <p:extLst>
       <p:ext uri="{BB962C8B-B14F-4D97-AF65-F5344CB8AC3E}">
+        <p14:creationId xmlns:p14="http://schemas.microsoft.com/office/powerpoint/2010/main" val="688421938"/>
+      </p:ext>
+    </p:extLst>
+  </p:cSld>
+  <p:clrMapOvr>
+    <a:masterClrMapping/>
+  </p:clrMapOvr>
+</p:notes>
+</file>
+
+<file path=ppt/notesSlides/notesSlide12.xml><?xml version="1.0" encoding="utf-8"?>
+<p:notes xmlns:a="http://schemas.openxmlformats.org/drawingml/2006/main" xmlns:r="http://schemas.openxmlformats.org/officeDocument/2006/relationships" xmlns:p="http://schemas.openxmlformats.org/presentationml/2006/main">
+  <p:cSld>
+    <p:spTree>
+      <p:nvGrpSpPr>
+        <p:cNvPr id="1" name=""/>
+        <p:cNvGrpSpPr/>
+        <p:nvPr/>
+      </p:nvGrpSpPr>
+      <p:grpSpPr>
+        <a:xfrm>
+          <a:off x="0" y="0"/>
+          <a:ext cx="0" cy="0"/>
+          <a:chOff x="0" y="0"/>
+          <a:chExt cx="0" cy="0"/>
+        </a:xfrm>
+      </p:grpSpPr>
+      <p:sp>
+        <p:nvSpPr>
+          <p:cNvPr id="2" name="Slide Image Placeholder 1"/>
+          <p:cNvSpPr>
+            <a:spLocks noGrp="1" noRot="1" noChangeAspect="1"/>
+          </p:cNvSpPr>
+          <p:nvPr>
+            <p:ph type="sldImg"/>
+          </p:nvPr>
+        </p:nvSpPr>
+        <p:spPr/>
+      </p:sp>
+      <p:sp>
+        <p:nvSpPr>
+          <p:cNvPr id="3" name="Notes Placeholder 2"/>
+          <p:cNvSpPr>
+            <a:spLocks noGrp="1"/>
+          </p:cNvSpPr>
+          <p:nvPr>
+            <p:ph type="body" idx="1"/>
+          </p:nvPr>
+        </p:nvSpPr>
+        <p:spPr/>
+        <p:txBody>
+          <a:bodyPr/>
+          <a:lstStyle/>
+          <a:p>
+            <a:pPr marL="0" marR="0" lvl="0" indent="0" algn="l" defTabSz="914400" rtl="0" eaLnBrk="1" fontAlgn="auto" latinLnBrk="0" hangingPunct="1">
+              <a:lnSpc>
+                <a:spcPct val="100000"/>
+              </a:lnSpc>
+              <a:spcBef>
+                <a:spcPts val="0"/>
+              </a:spcBef>
+              <a:spcAft>
+                <a:spcPts val="0"/>
+              </a:spcAft>
+              <a:buClrTx/>
+              <a:buSzTx/>
+              <a:buFontTx/>
+              <a:buNone/>
+              <a:tabLst/>
+              <a:defRPr/>
+            </a:pPr>
+            <a:r>
+              <a:rPr lang="en-US"/>
+              <a:t>https://r-pkgs.org/package-structure-state.html#bundled-package</a:t>
+            </a:r>
+            <a:endParaRPr lang="en-US" dirty="0"/>
+          </a:p>
+        </p:txBody>
+      </p:sp>
+      <p:sp>
+        <p:nvSpPr>
+          <p:cNvPr id="4" name="Slide Number Placeholder 3"/>
+          <p:cNvSpPr>
+            <a:spLocks noGrp="1"/>
+          </p:cNvSpPr>
+          <p:nvPr>
+            <p:ph type="sldNum" sz="quarter" idx="5"/>
+          </p:nvPr>
+        </p:nvSpPr>
+        <p:spPr/>
+        <p:txBody>
+          <a:bodyPr/>
+          <a:lstStyle/>
+          <a:p>
+            <a:fld id="{B9F26414-4BE6-427A-9F34-1430B41B92D6}" type="slidenum">
+              <a:rPr lang="en-US" smtClean="0"/>
+              <a:t>12</a:t>
+            </a:fld>
+            <a:endParaRPr lang="en-US"/>
+          </a:p>
+        </p:txBody>
+      </p:sp>
+    </p:spTree>
+    <p:extLst>
+      <p:ext uri="{BB962C8B-B14F-4D97-AF65-F5344CB8AC3E}">
+        <p14:creationId xmlns:p14="http://schemas.microsoft.com/office/powerpoint/2010/main" val="3736204489"/>
+      </p:ext>
+    </p:extLst>
+  </p:cSld>
+  <p:clrMapOvr>
+    <a:masterClrMapping/>
+  </p:clrMapOvr>
+</p:notes>
+</file>
+
+<file path=ppt/notesSlides/notesSlide13.xml><?xml version="1.0" encoding="utf-8"?>
+<p:notes xmlns:a="http://schemas.openxmlformats.org/drawingml/2006/main" xmlns:r="http://schemas.openxmlformats.org/officeDocument/2006/relationships" xmlns:p="http://schemas.openxmlformats.org/presentationml/2006/main">
+  <p:cSld>
+    <p:spTree>
+      <p:nvGrpSpPr>
+        <p:cNvPr id="1" name=""/>
+        <p:cNvGrpSpPr/>
+        <p:nvPr/>
+      </p:nvGrpSpPr>
+      <p:grpSpPr>
+        <a:xfrm>
+          <a:off x="0" y="0"/>
+          <a:ext cx="0" cy="0"/>
+          <a:chOff x="0" y="0"/>
+          <a:chExt cx="0" cy="0"/>
+        </a:xfrm>
+      </p:grpSpPr>
+      <p:sp>
+        <p:nvSpPr>
+          <p:cNvPr id="2" name="Slide Image Placeholder 1"/>
+          <p:cNvSpPr>
+            <a:spLocks noGrp="1" noRot="1" noChangeAspect="1"/>
+          </p:cNvSpPr>
+          <p:nvPr>
+            <p:ph type="sldImg"/>
+          </p:nvPr>
+        </p:nvSpPr>
+        <p:spPr/>
+      </p:sp>
+      <p:sp>
+        <p:nvSpPr>
+          <p:cNvPr id="3" name="Notes Placeholder 2"/>
+          <p:cNvSpPr>
+            <a:spLocks noGrp="1"/>
+          </p:cNvSpPr>
+          <p:nvPr>
+            <p:ph type="body" idx="1"/>
+          </p:nvPr>
+        </p:nvSpPr>
+        <p:spPr/>
+        <p:txBody>
+          <a:bodyPr/>
+          <a:lstStyle/>
+          <a:p>
+            <a:endParaRPr lang="en-US" dirty="0"/>
+          </a:p>
+        </p:txBody>
+      </p:sp>
+      <p:sp>
+        <p:nvSpPr>
+          <p:cNvPr id="4" name="Slide Number Placeholder 3"/>
+          <p:cNvSpPr>
+            <a:spLocks noGrp="1"/>
+          </p:cNvSpPr>
+          <p:nvPr>
+            <p:ph type="sldNum" sz="quarter" idx="5"/>
+          </p:nvPr>
+        </p:nvSpPr>
+        <p:spPr/>
+        <p:txBody>
+          <a:bodyPr/>
+          <a:lstStyle/>
+          <a:p>
+            <a:fld id="{B9F26414-4BE6-427A-9F34-1430B41B92D6}" type="slidenum">
+              <a:rPr lang="en-US" smtClean="0"/>
+              <a:t>13</a:t>
+            </a:fld>
+            <a:endParaRPr lang="en-US"/>
+          </a:p>
+        </p:txBody>
+      </p:sp>
+    </p:spTree>
+    <p:extLst>
+      <p:ext uri="{BB962C8B-B14F-4D97-AF65-F5344CB8AC3E}">
         <p14:creationId xmlns:p14="http://schemas.microsoft.com/office/powerpoint/2010/main" val="553560941"/>
       </p:ext>
     </p:extLst>
@@ -930,7 +1121,7 @@
     </p:spTree>
     <p:extLst>
       <p:ext uri="{BB962C8B-B14F-4D97-AF65-F5344CB8AC3E}">
-        <p14:creationId xmlns:p14="http://schemas.microsoft.com/office/powerpoint/2010/main" val="880762840"/>
+        <p14:creationId xmlns:p14="http://schemas.microsoft.com/office/powerpoint/2010/main" val="55548664"/>
       </p:ext>
     </p:extLst>
   </p:cSld>
@@ -1001,7 +1192,56 @@
               <a:tabLst/>
               <a:defRPr/>
             </a:pPr>
-            <a:endParaRPr lang="en-US" dirty="0"/>
+            <a:r>
+              <a:rPr lang="en-US" dirty="0"/>
+              <a:t>Why this should NOT be used for package development/distribution:</a:t>
+            </a:r>
+          </a:p>
+          <a:p>
+            <a:pPr marL="171450" marR="0" lvl="0" indent="-171450" algn="l" defTabSz="914400" rtl="0" eaLnBrk="1" fontAlgn="auto" latinLnBrk="0" hangingPunct="1">
+              <a:lnSpc>
+                <a:spcPct val="100000"/>
+              </a:lnSpc>
+              <a:spcBef>
+                <a:spcPts val="0"/>
+              </a:spcBef>
+              <a:spcAft>
+                <a:spcPts val="0"/>
+              </a:spcAft>
+              <a:buClrTx/>
+              <a:buSzTx/>
+              <a:buFontTx/>
+              <a:buChar char="-"/>
+              <a:tabLst/>
+              <a:defRPr/>
+            </a:pPr>
+            <a:r>
+              <a:rPr lang="en-US" dirty="0"/>
+              <a:t>Validation reports PDFs are not visible to users after installation</a:t>
+            </a:r>
+          </a:p>
+          <a:p>
+            <a:pPr marL="171450" marR="0" lvl="0" indent="-171450" algn="l" defTabSz="914400" rtl="0" eaLnBrk="1" fontAlgn="auto" latinLnBrk="0" hangingPunct="1">
+              <a:lnSpc>
+                <a:spcPct val="100000"/>
+              </a:lnSpc>
+              <a:spcBef>
+                <a:spcPts val="0"/>
+              </a:spcBef>
+              <a:spcAft>
+                <a:spcPts val="0"/>
+              </a:spcAft>
+              <a:buClrTx/>
+              <a:buSzTx/>
+              <a:buFontTx/>
+              <a:buChar char="-"/>
+              <a:tabLst/>
+              <a:defRPr/>
+            </a:pPr>
+            <a:r>
+              <a:rPr lang="en-US" dirty="0"/>
+              <a:t>Validation RMD cannot be run after install for re-validation</a:t>
+            </a:r>
           </a:p>
         </p:txBody>
       </p:sp>
@@ -1031,7 +1271,7 @@
     </p:spTree>
     <p:extLst>
       <p:ext uri="{BB962C8B-B14F-4D97-AF65-F5344CB8AC3E}">
-        <p14:creationId xmlns:p14="http://schemas.microsoft.com/office/powerpoint/2010/main" val="767338882"/>
+        <p14:creationId xmlns:p14="http://schemas.microsoft.com/office/powerpoint/2010/main" val="3372294121"/>
       </p:ext>
     </p:extLst>
   </p:cSld>
@@ -1115,7 +1355,7 @@
     </p:spTree>
     <p:extLst>
       <p:ext uri="{BB962C8B-B14F-4D97-AF65-F5344CB8AC3E}">
-        <p14:creationId xmlns:p14="http://schemas.microsoft.com/office/powerpoint/2010/main" val="688421938"/>
+        <p14:creationId xmlns:p14="http://schemas.microsoft.com/office/powerpoint/2010/main" val="880762840"/>
       </p:ext>
     </p:extLst>
   </p:cSld>
@@ -1216,7 +1456,7 @@
     </p:spTree>
     <p:extLst>
       <p:ext uri="{BB962C8B-B14F-4D97-AF65-F5344CB8AC3E}">
-        <p14:creationId xmlns:p14="http://schemas.microsoft.com/office/powerpoint/2010/main" val="3736204489"/>
+        <p14:creationId xmlns:p14="http://schemas.microsoft.com/office/powerpoint/2010/main" val="767338882"/>
       </p:ext>
     </p:extLst>
   </p:cSld>
@@ -5729,8 +5969,8 @@
         </p:nvSpPr>
         <p:spPr>
           <a:xfrm>
-            <a:off x="1286933" y="2218267"/>
-            <a:ext cx="10905067" cy="3970318"/>
+            <a:off x="1253479" y="1694160"/>
+            <a:ext cx="10321487" cy="5262979"/>
           </a:xfrm>
           <a:prstGeom prst="rect">
             <a:avLst/>
@@ -5790,7 +6030,7 @@
             </a:pPr>
             <a:r>
               <a:rPr lang="en-US" sz="2800" dirty="0"/>
-              <a:t>Installed environment has changed, but package has not</a:t>
+              <a:t>Run when environment has changed, but installation has not</a:t>
             </a:r>
           </a:p>
           <a:p>
@@ -5807,24 +6047,27 @@
             </a:pPr>
             <a:r>
               <a:rPr lang="en-US" sz="2800" dirty="0"/>
-              <a:t>Installation is controlled by Administration</a:t>
-            </a:r>
-          </a:p>
-          <a:p>
-            <a:pPr marL="285750" indent="-285750">
+              <a:t>Best for:</a:t>
+            </a:r>
+          </a:p>
+          <a:p>
+            <a:pPr marL="742950" lvl="1" indent="-285750">
               <a:buFont typeface="Arial" panose="020B0604020202020204" pitchFamily="34" charset="0"/>
               <a:buChar char="•"/>
             </a:pPr>
-            <a:endParaRPr lang="en-US" sz="2800" dirty="0"/>
-          </a:p>
-          <a:p>
-            <a:pPr marL="285750" indent="-285750">
+            <a:r>
+              <a:rPr lang="en-US" sz="2800" dirty="0"/>
+              <a:t>Installation is controlled by IT Administration</a:t>
+            </a:r>
+          </a:p>
+          <a:p>
+            <a:pPr marL="742950" lvl="1" indent="-285750">
               <a:buFont typeface="Arial" panose="020B0604020202020204" pitchFamily="34" charset="0"/>
               <a:buChar char="•"/>
             </a:pPr>
             <a:r>
               <a:rPr lang="en-US" sz="2800" dirty="0"/>
-              <a:t>Users have access to install as necessary</a:t>
+              <a:t>Users who need to verify that environment changes does not affect validation performance</a:t>
             </a:r>
           </a:p>
           <a:p>
@@ -5884,6 +6127,239 @@
         </p:nvSpPr>
         <p:spPr/>
         <p:txBody>
+          <a:bodyPr/>
+          <a:lstStyle/>
+          <a:p>
+            <a:r>
+              <a:rPr lang="en-US" dirty="0"/>
+              <a:t>Build</a:t>
+            </a:r>
+          </a:p>
+        </p:txBody>
+      </p:sp>
+    </p:spTree>
+    <p:extLst>
+      <p:ext uri="{BB962C8B-B14F-4D97-AF65-F5344CB8AC3E}">
+        <p14:creationId xmlns:p14="http://schemas.microsoft.com/office/powerpoint/2010/main" val="3899725400"/>
+      </p:ext>
+    </p:extLst>
+  </p:cSld>
+  <p:clrMapOvr>
+    <a:masterClrMapping/>
+  </p:clrMapOvr>
+</p:sld>
+</file>
+
+<file path=ppt/slides/slide12.xml><?xml version="1.0" encoding="utf-8"?>
+<p:sld xmlns:a="http://schemas.openxmlformats.org/drawingml/2006/main" xmlns:r="http://schemas.openxmlformats.org/officeDocument/2006/relationships" xmlns:p="http://schemas.openxmlformats.org/presentationml/2006/main">
+  <p:cSld>
+    <p:spTree>
+      <p:nvGrpSpPr>
+        <p:cNvPr id="1" name=""/>
+        <p:cNvGrpSpPr/>
+        <p:nvPr/>
+      </p:nvGrpSpPr>
+      <p:grpSpPr>
+        <a:xfrm>
+          <a:off x="0" y="0"/>
+          <a:ext cx="0" cy="0"/>
+          <a:chOff x="0" y="0"/>
+          <a:chExt cx="0" cy="0"/>
+        </a:xfrm>
+      </p:grpSpPr>
+      <p:sp>
+        <p:nvSpPr>
+          <p:cNvPr id="8" name="Title 7">
+            <a:extLst>
+              <a:ext uri="{FF2B5EF4-FFF2-40B4-BE49-F238E27FC236}">
+                <a16:creationId xmlns:a16="http://schemas.microsoft.com/office/drawing/2014/main" id="{6A34AC25-F9D4-48D7-A664-C590D06BF559}"/>
+              </a:ext>
+            </a:extLst>
+          </p:cNvPr>
+          <p:cNvSpPr>
+            <a:spLocks noGrp="1"/>
+          </p:cNvSpPr>
+          <p:nvPr>
+            <p:ph type="title"/>
+          </p:nvPr>
+        </p:nvSpPr>
+        <p:spPr/>
+        <p:txBody>
+          <a:bodyPr/>
+          <a:lstStyle/>
+          <a:p>
+            <a:r>
+              <a:rPr lang="en-US" dirty="0" err="1"/>
+              <a:t>vt_validate_build</a:t>
+            </a:r>
+            <a:r>
+              <a:rPr lang="en-US" dirty="0"/>
+              <a:t>()</a:t>
+            </a:r>
+          </a:p>
+        </p:txBody>
+      </p:sp>
+      <p:sp>
+        <p:nvSpPr>
+          <p:cNvPr id="5" name="TextBox 4">
+            <a:extLst>
+              <a:ext uri="{FF2B5EF4-FFF2-40B4-BE49-F238E27FC236}">
+                <a16:creationId xmlns:a16="http://schemas.microsoft.com/office/drawing/2014/main" id="{EF5BA94D-0FB3-4C60-9994-8A309B690D97}"/>
+              </a:ext>
+            </a:extLst>
+          </p:cNvPr>
+          <p:cNvSpPr txBox="1"/>
+          <p:nvPr/>
+        </p:nvSpPr>
+        <p:spPr>
+          <a:xfrm>
+            <a:off x="1286933" y="2218267"/>
+            <a:ext cx="10905067" cy="4401205"/>
+          </a:xfrm>
+          <a:prstGeom prst="rect">
+            <a:avLst/>
+          </a:prstGeom>
+          <a:noFill/>
+        </p:spPr>
+        <p:txBody>
+          <a:bodyPr wrap="square" rtlCol="0">
+            <a:spAutoFit/>
+          </a:bodyPr>
+          <a:lstStyle/>
+          <a:p>
+            <a:pPr marL="285750" indent="-285750">
+              <a:buFont typeface="Arial" panose="020B0604020202020204" pitchFamily="34" charset="0"/>
+              <a:buChar char="•"/>
+            </a:pPr>
+            <a:r>
+              <a:rPr lang="en-US" sz="2800" dirty="0"/>
+              <a:t>Temporarily installs the package and executes the validation Rmd</a:t>
+            </a:r>
+          </a:p>
+          <a:p>
+            <a:pPr marL="285750" indent="-285750">
+              <a:buFont typeface="Arial" panose="020B0604020202020204" pitchFamily="34" charset="0"/>
+              <a:buChar char="•"/>
+            </a:pPr>
+            <a:r>
+              <a:rPr lang="en-US" sz="2800" dirty="0"/>
+              <a:t>Copies contents into “output” directory – </a:t>
+            </a:r>
+            <a:r>
+              <a:rPr lang="en-US" sz="2800" dirty="0" err="1"/>
+              <a:t>inst</a:t>
+            </a:r>
+            <a:r>
+              <a:rPr lang="en-US" sz="2800" dirty="0"/>
+              <a:t>/validation</a:t>
+            </a:r>
+          </a:p>
+          <a:p>
+            <a:pPr marL="285750" indent="-285750">
+              <a:buFont typeface="Arial" panose="020B0604020202020204" pitchFamily="34" charset="0"/>
+              <a:buChar char="•"/>
+            </a:pPr>
+            <a:r>
+              <a:rPr lang="en-US" sz="2800" dirty="0"/>
+              <a:t>Builds source code, includes all components of validation into </a:t>
+            </a:r>
+            <a:r>
+              <a:rPr lang="en-US" sz="2800" dirty="0" err="1"/>
+              <a:t>tarball</a:t>
+            </a:r>
+            <a:endParaRPr lang="en-US" sz="2800" dirty="0"/>
+          </a:p>
+          <a:p>
+            <a:pPr marL="285750" indent="-285750">
+              <a:buFont typeface="Arial" panose="020B0604020202020204" pitchFamily="34" charset="0"/>
+              <a:buChar char="•"/>
+            </a:pPr>
+            <a:endParaRPr lang="en-US" sz="2800" dirty="0"/>
+          </a:p>
+          <a:p>
+            <a:pPr marL="285750" indent="-285750">
+              <a:buFont typeface="Arial" panose="020B0604020202020204" pitchFamily="34" charset="0"/>
+              <a:buChar char="•"/>
+            </a:pPr>
+            <a:r>
+              <a:rPr lang="en-US" sz="2800" dirty="0"/>
+              <a:t>For release of source code with controlled versions</a:t>
+            </a:r>
+          </a:p>
+          <a:p>
+            <a:pPr marL="285750" indent="-285750">
+              <a:buFont typeface="Arial" panose="020B0604020202020204" pitchFamily="34" charset="0"/>
+              <a:buChar char="•"/>
+            </a:pPr>
+            <a:endParaRPr lang="en-US" sz="2800" dirty="0"/>
+          </a:p>
+          <a:p>
+            <a:pPr marL="285750" indent="-285750">
+              <a:buFont typeface="Arial" panose="020B0604020202020204" pitchFamily="34" charset="0"/>
+              <a:buChar char="•"/>
+            </a:pPr>
+            <a:r>
+              <a:rPr lang="en-US" sz="2800" dirty="0"/>
+              <a:t>Users have access to install as necessary</a:t>
+            </a:r>
+          </a:p>
+          <a:p>
+            <a:pPr marL="285750" indent="-285750">
+              <a:buFont typeface="Arial" panose="020B0604020202020204" pitchFamily="34" charset="0"/>
+              <a:buChar char="•"/>
+            </a:pPr>
+            <a:endParaRPr lang="en-US" sz="2800" dirty="0"/>
+          </a:p>
+        </p:txBody>
+      </p:sp>
+    </p:spTree>
+    <p:extLst>
+      <p:ext uri="{BB962C8B-B14F-4D97-AF65-F5344CB8AC3E}">
+        <p14:creationId xmlns:p14="http://schemas.microsoft.com/office/powerpoint/2010/main" val="1540812988"/>
+      </p:ext>
+    </p:extLst>
+  </p:cSld>
+  <p:clrMapOvr>
+    <a:masterClrMapping/>
+  </p:clrMapOvr>
+</p:sld>
+</file>
+
+<file path=ppt/slides/slide13.xml><?xml version="1.0" encoding="utf-8"?>
+<p:sld xmlns:a="http://schemas.openxmlformats.org/drawingml/2006/main" xmlns:r="http://schemas.openxmlformats.org/officeDocument/2006/relationships" xmlns:p="http://schemas.openxmlformats.org/presentationml/2006/main">
+  <p:cSld>
+    <p:spTree>
+      <p:nvGrpSpPr>
+        <p:cNvPr id="1" name=""/>
+        <p:cNvGrpSpPr/>
+        <p:nvPr/>
+      </p:nvGrpSpPr>
+      <p:grpSpPr>
+        <a:xfrm>
+          <a:off x="0" y="0"/>
+          <a:ext cx="0" cy="0"/>
+          <a:chOff x="0" y="0"/>
+          <a:chExt cx="0" cy="0"/>
+        </a:xfrm>
+      </p:grpSpPr>
+      <p:sp>
+        <p:nvSpPr>
+          <p:cNvPr id="2" name="Title 1">
+            <a:extLst>
+              <a:ext uri="{FF2B5EF4-FFF2-40B4-BE49-F238E27FC236}">
+                <a16:creationId xmlns:a16="http://schemas.microsoft.com/office/drawing/2014/main" id="{7614332B-4F24-42F4-A704-A6F1183E9470}"/>
+              </a:ext>
+            </a:extLst>
+          </p:cNvPr>
+          <p:cNvSpPr>
+            <a:spLocks noGrp="1"/>
+          </p:cNvSpPr>
+          <p:nvPr>
+            <p:ph type="ctrTitle"/>
+          </p:nvPr>
+        </p:nvSpPr>
+        <p:spPr/>
+        <p:txBody>
           <a:bodyPr>
             <a:normAutofit/>
           </a:bodyPr>
@@ -6031,7 +6507,36 @@
             <a:pPr lvl="1"/>
             <a:r>
               <a:rPr lang="en-US" sz="2000" dirty="0"/>
+              <a:t>3</a:t>
+            </a:r>
+            <a:r>
+              <a:rPr lang="en-US" sz="2000" baseline="30000" dirty="0"/>
+              <a:t>rd</a:t>
+            </a:r>
+            <a:r>
+              <a:rPr lang="en-US" sz="2000" dirty="0"/>
+              <a:t> party</a:t>
+            </a:r>
+          </a:p>
+          <a:p>
+            <a:pPr lvl="1"/>
+            <a:r>
+              <a:rPr lang="en-US" sz="2000" dirty="0"/>
               <a:t>Source</a:t>
+            </a:r>
+          </a:p>
+          <a:p>
+            <a:pPr lvl="1"/>
+            <a:r>
+              <a:rPr lang="en-US" sz="2000" dirty="0"/>
+              <a:t>Install</a:t>
+            </a:r>
+          </a:p>
+          <a:p>
+            <a:pPr lvl="1"/>
+            <a:r>
+              <a:rPr lang="en-US" sz="2000" dirty="0"/>
+              <a:t>Re-validation</a:t>
             </a:r>
           </a:p>
           <a:p>
@@ -6043,17 +6548,7 @@
           </a:p>
           <a:p>
             <a:pPr lvl="1"/>
-            <a:r>
-              <a:rPr lang="en-US" sz="2000" dirty="0"/>
-              <a:t>Install</a:t>
-            </a:r>
-          </a:p>
-          <a:p>
-            <a:pPr lvl="1"/>
-            <a:r>
-              <a:rPr lang="en-US" sz="2000" dirty="0"/>
-              <a:t>Re-validation</a:t>
-            </a:r>
+            <a:endParaRPr lang="en-US" sz="2000" dirty="0"/>
           </a:p>
           <a:p>
             <a:endParaRPr lang="en-US" sz="2400" dirty="0"/>
@@ -6113,15 +6608,20 @@
           <a:p>
             <a:r>
               <a:rPr lang="en-US" dirty="0"/>
-              <a:t>Source</a:t>
-            </a:r>
+              <a:t>Third </a:t>
+            </a:r>
+            <a:r>
+              <a:rPr lang="en-US" dirty="0" err="1"/>
+              <a:t>PArty</a:t>
+            </a:r>
+            <a:endParaRPr lang="en-US" dirty="0"/>
           </a:p>
         </p:txBody>
       </p:sp>
     </p:spTree>
     <p:extLst>
       <p:ext uri="{BB962C8B-B14F-4D97-AF65-F5344CB8AC3E}">
-        <p14:creationId xmlns:p14="http://schemas.microsoft.com/office/powerpoint/2010/main" val="2742486074"/>
+        <p14:creationId xmlns:p14="http://schemas.microsoft.com/office/powerpoint/2010/main" val="1541033948"/>
       </p:ext>
     </p:extLst>
   </p:cSld>
@@ -6171,7 +6671,7 @@
           <a:p>
             <a:r>
               <a:rPr lang="en-US" dirty="0" err="1"/>
-              <a:t>vt_validate_source</a:t>
+              <a:t>vt_validate_report</a:t>
             </a:r>
             <a:r>
               <a:rPr lang="en-US" dirty="0"/>
@@ -6195,7 +6695,7 @@
         <p:spPr>
           <a:xfrm>
             <a:off x="1286933" y="2218267"/>
-            <a:ext cx="10905067" cy="3539430"/>
+            <a:ext cx="10905067" cy="2677656"/>
           </a:xfrm>
           <a:prstGeom prst="rect">
             <a:avLst/>
@@ -6214,7 +6714,20 @@
             </a:pPr>
             <a:r>
               <a:rPr lang="en-US" sz="2800" dirty="0"/>
-              <a:t>Temporarily installs the package and executes the validation Rmd</a:t>
+              <a:t>Uses only packages already installed on system</a:t>
+            </a:r>
+          </a:p>
+          <a:p>
+            <a:endParaRPr lang="en-US" sz="2800" dirty="0"/>
+          </a:p>
+          <a:p>
+            <a:pPr marL="285750" indent="-285750">
+              <a:buFont typeface="Arial" panose="020B0604020202020204" pitchFamily="34" charset="0"/>
+              <a:buChar char="•"/>
+            </a:pPr>
+            <a:r>
+              <a:rPr lang="en-US" sz="2800" dirty="0"/>
+              <a:t>Report can be generated at any time</a:t>
             </a:r>
           </a:p>
           <a:p>
@@ -6231,41 +6744,7 @@
             </a:pPr>
             <a:r>
               <a:rPr lang="en-US" sz="2800" dirty="0"/>
-              <a:t>For release of source code</a:t>
-            </a:r>
-          </a:p>
-          <a:p>
-            <a:pPr marL="285750" indent="-285750">
-              <a:buFont typeface="Arial" panose="020B0604020202020204" pitchFamily="34" charset="0"/>
-              <a:buChar char="•"/>
-            </a:pPr>
-            <a:endParaRPr lang="en-US" sz="2800" dirty="0"/>
-          </a:p>
-          <a:p>
-            <a:pPr marL="285750" indent="-285750">
-              <a:buFont typeface="Arial" panose="020B0604020202020204" pitchFamily="34" charset="0"/>
-              <a:buChar char="•"/>
-            </a:pPr>
-            <a:r>
-              <a:rPr lang="en-US" sz="2800" dirty="0"/>
-              <a:t>Users have access to install as necessary</a:t>
-            </a:r>
-          </a:p>
-          <a:p>
-            <a:pPr marL="285750" indent="-285750">
-              <a:buFont typeface="Arial" panose="020B0604020202020204" pitchFamily="34" charset="0"/>
-              <a:buChar char="•"/>
-            </a:pPr>
-            <a:endParaRPr lang="en-US" sz="2800" dirty="0"/>
-          </a:p>
-          <a:p>
-            <a:pPr marL="285750" indent="-285750">
-              <a:buFont typeface="Arial" panose="020B0604020202020204" pitchFamily="34" charset="0"/>
-              <a:buChar char="•"/>
-            </a:pPr>
-            <a:r>
-              <a:rPr lang="en-US" sz="2800" dirty="0"/>
-              <a:t>Report can be generated at any time</a:t>
+              <a:t>Best for: validation of packages the org is consuming but not developing</a:t>
             </a:r>
           </a:p>
         </p:txBody>
@@ -6273,7 +6752,7 @@
     </p:spTree>
     <p:extLst>
       <p:ext uri="{BB962C8B-B14F-4D97-AF65-F5344CB8AC3E}">
-        <p14:creationId xmlns:p14="http://schemas.microsoft.com/office/powerpoint/2010/main" val="156219768"/>
+        <p14:creationId xmlns:p14="http://schemas.microsoft.com/office/powerpoint/2010/main" val="733000133"/>
       </p:ext>
     </p:extLst>
   </p:cSld>
@@ -6323,7 +6802,7 @@
           <a:p>
             <a:r>
               <a:rPr lang="en-US" dirty="0"/>
-              <a:t>Build</a:t>
+              <a:t>Source</a:t>
             </a:r>
           </a:p>
         </p:txBody>
@@ -6331,7 +6810,7 @@
     </p:spTree>
     <p:extLst>
       <p:ext uri="{BB962C8B-B14F-4D97-AF65-F5344CB8AC3E}">
-        <p14:creationId xmlns:p14="http://schemas.microsoft.com/office/powerpoint/2010/main" val="3899725400"/>
+        <p14:creationId xmlns:p14="http://schemas.microsoft.com/office/powerpoint/2010/main" val="2742486074"/>
       </p:ext>
     </p:extLst>
   </p:cSld>
@@ -6381,7 +6860,7 @@
           <a:p>
             <a:r>
               <a:rPr lang="en-US" dirty="0" err="1"/>
-              <a:t>vt_validate_build</a:t>
+              <a:t>vt_validate_source</a:t>
             </a:r>
             <a:r>
               <a:rPr lang="en-US" dirty="0"/>
@@ -6404,8 +6883,8 @@
         </p:nvSpPr>
         <p:spPr>
           <a:xfrm>
-            <a:off x="1286933" y="2218267"/>
-            <a:ext cx="10905067" cy="4401205"/>
+            <a:off x="963548" y="1976564"/>
+            <a:ext cx="10905067" cy="4955203"/>
           </a:xfrm>
           <a:prstGeom prst="rect">
             <a:avLst/>
@@ -6423,7 +6902,7 @@
               <a:buChar char="•"/>
             </a:pPr>
             <a:r>
-              <a:rPr lang="en-US" sz="2800" dirty="0"/>
+              <a:rPr lang="en-US" sz="2400" dirty="0"/>
               <a:t>Temporarily installs the package and executes the validation Rmd</a:t>
             </a:r>
           </a:p>
@@ -6432,18 +6911,7 @@
               <a:buFont typeface="Arial" panose="020B0604020202020204" pitchFamily="34" charset="0"/>
               <a:buChar char="•"/>
             </a:pPr>
-            <a:r>
-              <a:rPr lang="en-US" sz="2800" dirty="0"/>
-              <a:t>Copies contents into “output” directory – </a:t>
-            </a:r>
-            <a:r>
-              <a:rPr lang="en-US" sz="2800" dirty="0" err="1"/>
-              <a:t>inst</a:t>
-            </a:r>
-            <a:r>
-              <a:rPr lang="en-US" sz="2800" dirty="0"/>
-              <a:t>/validation</a:t>
-            </a:r>
+            <a:endParaRPr lang="en-US" sz="2400" dirty="0"/>
           </a:p>
           <a:p>
             <a:pPr marL="285750" indent="-285750">
@@ -6451,14 +6919,94 @@
               <a:buChar char="•"/>
             </a:pPr>
             <a:r>
-              <a:rPr lang="en-US" sz="2800" dirty="0"/>
-              <a:t>Builds source code, includes all components of validation into </a:t>
-            </a:r>
-            <a:r>
-              <a:rPr lang="en-US" sz="2800" dirty="0" err="1"/>
-              <a:t>tarball</a:t>
-            </a:r>
-            <a:endParaRPr lang="en-US" sz="2800" dirty="0"/>
+              <a:rPr lang="en-US" sz="2400" dirty="0"/>
+              <a:t>For release of source code</a:t>
+            </a:r>
+          </a:p>
+          <a:p>
+            <a:pPr marL="285750" indent="-285750">
+              <a:buFont typeface="Arial" panose="020B0604020202020204" pitchFamily="34" charset="0"/>
+              <a:buChar char="•"/>
+            </a:pPr>
+            <a:endParaRPr lang="en-US" sz="2400" dirty="0"/>
+          </a:p>
+          <a:p>
+            <a:pPr marL="285750" indent="-285750">
+              <a:buFont typeface="Arial" panose="020B0604020202020204" pitchFamily="34" charset="0"/>
+              <a:buChar char="•"/>
+            </a:pPr>
+            <a:r>
+              <a:rPr lang="en-US" sz="2400" dirty="0"/>
+              <a:t>Users have access to install as necessary</a:t>
+            </a:r>
+          </a:p>
+          <a:p>
+            <a:pPr marL="285750" indent="-285750">
+              <a:buFont typeface="Arial" panose="020B0604020202020204" pitchFamily="34" charset="0"/>
+              <a:buChar char="•"/>
+            </a:pPr>
+            <a:endParaRPr lang="en-US" sz="2400" dirty="0"/>
+          </a:p>
+          <a:p>
+            <a:pPr marL="285750" indent="-285750">
+              <a:buFont typeface="Arial" panose="020B0604020202020204" pitchFamily="34" charset="0"/>
+              <a:buChar char="•"/>
+            </a:pPr>
+            <a:r>
+              <a:rPr lang="en-US" sz="2400" dirty="0"/>
+              <a:t>Report can be generated at any time</a:t>
+            </a:r>
+          </a:p>
+          <a:p>
+            <a:pPr marL="285750" indent="-285750">
+              <a:buFont typeface="Arial" panose="020B0604020202020204" pitchFamily="34" charset="0"/>
+              <a:buChar char="•"/>
+            </a:pPr>
+            <a:endParaRPr lang="en-US" sz="2400" dirty="0"/>
+          </a:p>
+          <a:p>
+            <a:pPr marL="285750" indent="-285750">
+              <a:buFont typeface="Arial" panose="020B0604020202020204" pitchFamily="34" charset="0"/>
+              <a:buChar char="•"/>
+            </a:pPr>
+            <a:r>
+              <a:rPr lang="en-US" sz="2400" dirty="0"/>
+              <a:t>Best for: </a:t>
+            </a:r>
+          </a:p>
+          <a:p>
+            <a:pPr marL="742950" lvl="1" indent="-285750">
+              <a:buFont typeface="Arial" panose="020B0604020202020204" pitchFamily="34" charset="0"/>
+              <a:buChar char="•"/>
+            </a:pPr>
+            <a:r>
+              <a:rPr lang="en-US" sz="2400" dirty="0"/>
+              <a:t>Checking validation during package development</a:t>
+            </a:r>
+          </a:p>
+          <a:p>
+            <a:pPr marL="742950" lvl="1" indent="-285750">
+              <a:buFont typeface="Arial" panose="020B0604020202020204" pitchFamily="34" charset="0"/>
+              <a:buChar char="•"/>
+            </a:pPr>
+            <a:r>
+              <a:rPr lang="en-US" sz="2400" dirty="0" err="1"/>
+              <a:t>c.i.</a:t>
+            </a:r>
+            <a:r>
+              <a:rPr lang="en-US" sz="2400" dirty="0"/>
+              <a:t> integration</a:t>
+            </a:r>
+          </a:p>
+          <a:p>
+            <a:pPr marL="742950" lvl="1" indent="-285750">
+              <a:buFont typeface="Arial" panose="020B0604020202020204" pitchFamily="34" charset="0"/>
+              <a:buChar char="•"/>
+            </a:pPr>
+            <a:r>
+              <a:rPr lang="en-US" sz="2400" dirty="0"/>
+              <a:t>Sending report PDFs to a shared drive location</a:t>
+            </a:r>
           </a:p>
           <a:p>
             <a:pPr marL="285750" indent="-285750">
@@ -6467,46 +7015,12 @@
             </a:pPr>
             <a:endParaRPr lang="en-US" sz="2800" dirty="0"/>
           </a:p>
-          <a:p>
-            <a:pPr marL="285750" indent="-285750">
-              <a:buFont typeface="Arial" panose="020B0604020202020204" pitchFamily="34" charset="0"/>
-              <a:buChar char="•"/>
-            </a:pPr>
-            <a:r>
-              <a:rPr lang="en-US" sz="2800" dirty="0"/>
-              <a:t>For release of source code with controlled versions</a:t>
-            </a:r>
-          </a:p>
-          <a:p>
-            <a:pPr marL="285750" indent="-285750">
-              <a:buFont typeface="Arial" panose="020B0604020202020204" pitchFamily="34" charset="0"/>
-              <a:buChar char="•"/>
-            </a:pPr>
-            <a:endParaRPr lang="en-US" sz="2800" dirty="0"/>
-          </a:p>
-          <a:p>
-            <a:pPr marL="285750" indent="-285750">
-              <a:buFont typeface="Arial" panose="020B0604020202020204" pitchFamily="34" charset="0"/>
-              <a:buChar char="•"/>
-            </a:pPr>
-            <a:r>
-              <a:rPr lang="en-US" sz="2800" dirty="0"/>
-              <a:t>Users have access to install as necessary</a:t>
-            </a:r>
-          </a:p>
-          <a:p>
-            <a:pPr marL="285750" indent="-285750">
-              <a:buFont typeface="Arial" panose="020B0604020202020204" pitchFamily="34" charset="0"/>
-              <a:buChar char="•"/>
-            </a:pPr>
-            <a:endParaRPr lang="en-US" sz="2800" dirty="0"/>
-          </a:p>
         </p:txBody>
       </p:sp>
     </p:spTree>
     <p:extLst>
       <p:ext uri="{BB962C8B-B14F-4D97-AF65-F5344CB8AC3E}">
-        <p14:creationId xmlns:p14="http://schemas.microsoft.com/office/powerpoint/2010/main" val="1540812988"/>
+        <p14:creationId xmlns:p14="http://schemas.microsoft.com/office/powerpoint/2010/main" val="156219768"/>
       </p:ext>
     </p:extLst>
   </p:cSld>
@@ -6637,8 +7151,8 @@
         </p:nvSpPr>
         <p:spPr>
           <a:xfrm>
-            <a:off x="1286933" y="2218267"/>
-            <a:ext cx="10905067" cy="3970318"/>
+            <a:off x="1609494" y="2296326"/>
+            <a:ext cx="9630936" cy="4154984"/>
           </a:xfrm>
           <a:prstGeom prst="rect">
             <a:avLst/>
@@ -6656,7 +7170,7 @@
               <a:buChar char="•"/>
             </a:pPr>
             <a:r>
-              <a:rPr lang="en-US" sz="2800" dirty="0"/>
+              <a:rPr lang="en-US" sz="2400" dirty="0"/>
               <a:t>Temporarily installs the package and executes the validation Rmd</a:t>
             </a:r>
           </a:p>
@@ -6666,15 +7180,15 @@
               <a:buChar char="•"/>
             </a:pPr>
             <a:r>
-              <a:rPr lang="en-US" sz="2800" dirty="0"/>
+              <a:rPr lang="en-US" sz="2400" dirty="0"/>
               <a:t>Copies contents into “output” directory – </a:t>
             </a:r>
             <a:r>
-              <a:rPr lang="en-US" sz="2800" dirty="0" err="1"/>
+              <a:rPr lang="en-US" sz="2400" dirty="0" err="1"/>
               <a:t>inst</a:t>
             </a:r>
             <a:r>
-              <a:rPr lang="en-US" sz="2800" dirty="0"/>
+              <a:rPr lang="en-US" sz="2400" dirty="0"/>
               <a:t>/validation</a:t>
             </a:r>
           </a:p>
@@ -6684,14 +7198,14 @@
               <a:buChar char="•"/>
             </a:pPr>
             <a:r>
-              <a:rPr lang="en-US" sz="2800" dirty="0"/>
+              <a:rPr lang="en-US" sz="2400" dirty="0"/>
               <a:t>Builds source code, includes all components of validation into </a:t>
             </a:r>
             <a:r>
-              <a:rPr lang="en-US" sz="2800" dirty="0" err="1"/>
+              <a:rPr lang="en-US" sz="2400" dirty="0" err="1"/>
               <a:t>tarball</a:t>
             </a:r>
-            <a:endParaRPr lang="en-US" sz="2800" dirty="0"/>
+            <a:endParaRPr lang="en-US" sz="2400" dirty="0"/>
           </a:p>
           <a:p>
             <a:pPr marL="285750" indent="-285750">
@@ -6699,7 +7213,7 @@
               <a:buChar char="•"/>
             </a:pPr>
             <a:r>
-              <a:rPr lang="en-US" sz="2800" dirty="0"/>
+              <a:rPr lang="en-US" sz="2400" dirty="0"/>
               <a:t>Installs and runs validation report on installed system</a:t>
             </a:r>
           </a:p>
@@ -6708,7 +7222,7 @@
               <a:buFont typeface="Arial" panose="020B0604020202020204" pitchFamily="34" charset="0"/>
               <a:buChar char="•"/>
             </a:pPr>
-            <a:endParaRPr lang="en-US" sz="2800" dirty="0"/>
+            <a:endParaRPr lang="en-US" sz="2400" dirty="0"/>
           </a:p>
           <a:p>
             <a:pPr marL="285750" indent="-285750">
@@ -6716,18 +7230,28 @@
               <a:buChar char="•"/>
             </a:pPr>
             <a:r>
-              <a:rPr lang="en-US" sz="2800" dirty="0"/>
-              <a:t>Installation is controlled by Administration</a:t>
-            </a:r>
-          </a:p>
-          <a:p>
-            <a:pPr marL="285750" indent="-285750">
+              <a:rPr lang="en-US" sz="2400" dirty="0"/>
+              <a:t>Best for:</a:t>
+            </a:r>
+          </a:p>
+          <a:p>
+            <a:pPr marL="742950" lvl="1" indent="-285750">
               <a:buFont typeface="Arial" panose="020B0604020202020204" pitchFamily="34" charset="0"/>
               <a:buChar char="•"/>
             </a:pPr>
             <a:r>
-              <a:rPr lang="en-US" sz="2800" dirty="0"/>
-              <a:t>Validation Report needs to be saved to a specific location</a:t>
+              <a:rPr lang="en-US" sz="2400" dirty="0"/>
+              <a:t>Installation is controlled by IT Administration</a:t>
+            </a:r>
+          </a:p>
+          <a:p>
+            <a:pPr marL="742950" lvl="1" indent="-285750">
+              <a:buFont typeface="Arial" panose="020B0604020202020204" pitchFamily="34" charset="0"/>
+              <a:buChar char="•"/>
+            </a:pPr>
+            <a:r>
+              <a:rPr lang="en-US" sz="2400" dirty="0"/>
+              <a:t>Validation Report needs co-located with installed package</a:t>
             </a:r>
           </a:p>
         </p:txBody>
@@ -7375,6 +7899,24 @@
 </file>
 
 <file path=customXml/item1.xml><?xml version="1.0" encoding="utf-8"?>
+<p:properties xmlns:p="http://schemas.microsoft.com/office/2006/metadata/properties" xmlns:xsi="http://www.w3.org/2001/XMLSchema-instance" xmlns:pc="http://schemas.microsoft.com/office/infopath/2007/PartnerControls">
+  <documentManagement>
+    <Status xmlns="71af3243-3dd4-4a8d-8c0d-dd76da1f02a5">Not started</Status>
+    <MediaServiceKeyPoints xmlns="71af3243-3dd4-4a8d-8c0d-dd76da1f02a5" xsi:nil="true"/>
+  </documentManagement>
+</p:properties>
+</file>
+
+<file path=customXml/item2.xml><?xml version="1.0" encoding="utf-8"?>
+<?mso-contentType ?>
+<FormTemplates xmlns="http://schemas.microsoft.com/sharepoint/v3/contenttype/forms">
+  <Display>DocumentLibraryForm</Display>
+  <Edit>DocumentLibraryForm</Edit>
+  <New>DocumentLibraryForm</New>
+</FormTemplates>
+</file>
+
+<file path=customXml/item3.xml><?xml version="1.0" encoding="utf-8"?>
 <ct:contentTypeSchema xmlns:ct="http://schemas.microsoft.com/office/2006/metadata/contentType" xmlns:ma="http://schemas.microsoft.com/office/2006/metadata/properties/metaAttributes" ct:_="" ma:_="" ma:contentTypeName="Document" ma:contentTypeID="0x01010079F111ED35F8CC479449609E8A0923A6" ma:contentTypeVersion="12" ma:contentTypeDescription="Create a new document." ma:contentTypeScope="" ma:versionID="a410dd7f93c95333ffa1b60ed6adedd1">
   <xsd:schema xmlns:xsd="http://www.w3.org/2001/XMLSchema" xmlns:xs="http://www.w3.org/2001/XMLSchema" xmlns:p="http://schemas.microsoft.com/office/2006/metadata/properties" xmlns:ns2="71af3243-3dd4-4a8d-8c0d-dd76da1f02a5" xmlns:ns3="16c05727-aa75-4e4a-9b5f-8a80a1165891" targetNamespace="http://schemas.microsoft.com/office/2006/metadata/properties" ma:root="true" ma:fieldsID="a936d9baba76aa3866493feff160faab" ns2:_="" ns3:_="">
     <xsd:import namespace="71af3243-3dd4-4a8d-8c0d-dd76da1f02a5"/>
@@ -7595,25 +8137,32 @@
 </ct:contentTypeSchema>
 </file>
 
-<file path=customXml/item2.xml><?xml version="1.0" encoding="utf-8"?>
-<?mso-contentType ?>
-<FormTemplates xmlns="http://schemas.microsoft.com/sharepoint/v3/contenttype/forms">
-  <Display>DocumentLibraryForm</Display>
-  <Edit>DocumentLibraryForm</Edit>
-  <New>DocumentLibraryForm</New>
-</FormTemplates>
+<file path=customXml/itemProps1.xml><?xml version="1.0" encoding="utf-8"?>
+<ds:datastoreItem xmlns:ds="http://schemas.openxmlformats.org/officeDocument/2006/customXml" ds:itemID="{137651BA-F45C-4845-9AB3-E0A65B39F5E1}">
+  <ds:schemaRefs>
+    <ds:schemaRef ds:uri="http://schemas.microsoft.com/office/infopath/2007/PartnerControls"/>
+    <ds:schemaRef ds:uri="http://purl.org/dc/elements/1.1/"/>
+    <ds:schemaRef ds:uri="http://schemas.microsoft.com/office/2006/metadata/properties"/>
+    <ds:schemaRef ds:uri="http://purl.org/dc/terms/"/>
+    <ds:schemaRef ds:uri="http://schemas.openxmlformats.org/package/2006/metadata/core-properties"/>
+    <ds:schemaRef ds:uri="http://schemas.microsoft.com/office/2006/documentManagement/types"/>
+    <ds:schemaRef ds:uri="http://purl.org/dc/dcmitype/"/>
+    <ds:schemaRef ds:uri="16c05727-aa75-4e4a-9b5f-8a80a1165891"/>
+    <ds:schemaRef ds:uri="71af3243-3dd4-4a8d-8c0d-dd76da1f02a5"/>
+    <ds:schemaRef ds:uri="http://www.w3.org/XML/1998/namespace"/>
+  </ds:schemaRefs>
+</ds:datastoreItem>
 </file>
 
-<file path=customXml/item3.xml><?xml version="1.0" encoding="utf-8"?>
-<p:properties xmlns:p="http://schemas.microsoft.com/office/2006/metadata/properties" xmlns:xsi="http://www.w3.org/2001/XMLSchema-instance" xmlns:pc="http://schemas.microsoft.com/office/infopath/2007/PartnerControls">
-  <documentManagement>
-    <Status xmlns="71af3243-3dd4-4a8d-8c0d-dd76da1f02a5">Not started</Status>
-    <MediaServiceKeyPoints xmlns="71af3243-3dd4-4a8d-8c0d-dd76da1f02a5" xsi:nil="true"/>
-  </documentManagement>
-</p:properties>
+<file path=customXml/itemProps2.xml><?xml version="1.0" encoding="utf-8"?>
+<ds:datastoreItem xmlns:ds="http://schemas.openxmlformats.org/officeDocument/2006/customXml" ds:itemID="{CDB58277-F8DF-46FF-84EC-EF41B835E69F}">
+  <ds:schemaRefs>
+    <ds:schemaRef ds:uri="http://schemas.microsoft.com/sharepoint/v3/contenttype/forms"/>
+  </ds:schemaRefs>
+</ds:datastoreItem>
 </file>
 
-<file path=customXml/itemProps1.xml><?xml version="1.0" encoding="utf-8"?>
+<file path=customXml/itemProps3.xml><?xml version="1.0" encoding="utf-8"?>
 <ds:datastoreItem xmlns:ds="http://schemas.openxmlformats.org/officeDocument/2006/customXml" ds:itemID="{2D276E62-80A3-44DD-9BCC-97ED2B99B57F}">
   <ds:schemaRefs>
     <ds:schemaRef ds:uri="http://schemas.microsoft.com/office/2006/metadata/contentType"/>
@@ -7630,29 +8179,4 @@
     <ds:schemaRef ds:uri="http://schemas.microsoft.com/internal/obd"/>
   </ds:schemaRefs>
 </ds:datastoreItem>
-</file>
-
-<file path=customXml/itemProps2.xml><?xml version="1.0" encoding="utf-8"?>
-<ds:datastoreItem xmlns:ds="http://schemas.openxmlformats.org/officeDocument/2006/customXml" ds:itemID="{CDB58277-F8DF-46FF-84EC-EF41B835E69F}">
-  <ds:schemaRefs>
-    <ds:schemaRef ds:uri="http://schemas.microsoft.com/sharepoint/v3/contenttype/forms"/>
-  </ds:schemaRefs>
-</ds:datastoreItem>
-</file>
-
-<file path=customXml/itemProps3.xml><?xml version="1.0" encoding="utf-8"?>
-<ds:datastoreItem xmlns:ds="http://schemas.openxmlformats.org/officeDocument/2006/customXml" ds:itemID="{137651BA-F45C-4845-9AB3-E0A65B39F5E1}">
-  <ds:schemaRefs>
-    <ds:schemaRef ds:uri="http://schemas.microsoft.com/office/infopath/2007/PartnerControls"/>
-    <ds:schemaRef ds:uri="http://purl.org/dc/elements/1.1/"/>
-    <ds:schemaRef ds:uri="http://schemas.microsoft.com/office/2006/metadata/properties"/>
-    <ds:schemaRef ds:uri="http://purl.org/dc/terms/"/>
-    <ds:schemaRef ds:uri="http://schemas.openxmlformats.org/package/2006/metadata/core-properties"/>
-    <ds:schemaRef ds:uri="http://schemas.microsoft.com/office/2006/documentManagement/types"/>
-    <ds:schemaRef ds:uri="http://purl.org/dc/dcmitype/"/>
-    <ds:schemaRef ds:uri="16c05727-aa75-4e4a-9b5f-8a80a1165891"/>
-    <ds:schemaRef ds:uri="71af3243-3dd4-4a8d-8c0d-dd76da1f02a5"/>
-    <ds:schemaRef ds:uri="http://www.w3.org/XML/1998/namespace"/>
-  </ds:schemaRefs>
-</ds:datastoreItem>
 </file>
</xml_diff>